<commit_message>
Added schematic, links modified
</commit_message>
<xml_diff>
--- a/Fabricación casera de circuitos impresos - MakersUPV.pptx
+++ b/Fabricación casera de circuitos impresos - MakersUPV.pptx
@@ -232,7 +232,7 @@
           <a:p>
             <a:fld id="{410E2AB4-4692-4284-8736-F3C624373180}" type="datetimeFigureOut">
               <a:rPr lang="es-ES" smtClean="0"/>
-              <a:t>03/06/2017</a:t>
+              <a:t>04/06/2017</a:t>
             </a:fld>
             <a:endParaRPr lang="es-ES"/>
           </a:p>
@@ -644,7 +644,7 @@
           <a:p>
             <a:fld id="{4A4742DE-6149-4F75-B5AD-2A8ADB954AD9}" type="datetimeFigureOut">
               <a:rPr lang="en-GB" smtClean="0"/>
-              <a:t>03/06/2017</a:t>
+              <a:t>04/06/2017</a:t>
             </a:fld>
             <a:endParaRPr lang="en-GB"/>
           </a:p>
@@ -814,7 +814,7 @@
           <a:p>
             <a:fld id="{4A4742DE-6149-4F75-B5AD-2A8ADB954AD9}" type="datetimeFigureOut">
               <a:rPr lang="en-GB" smtClean="0"/>
-              <a:t>03/06/2017</a:t>
+              <a:t>04/06/2017</a:t>
             </a:fld>
             <a:endParaRPr lang="en-GB"/>
           </a:p>
@@ -994,7 +994,7 @@
           <a:p>
             <a:fld id="{4A4742DE-6149-4F75-B5AD-2A8ADB954AD9}" type="datetimeFigureOut">
               <a:rPr lang="en-GB" smtClean="0"/>
-              <a:t>03/06/2017</a:t>
+              <a:t>04/06/2017</a:t>
             </a:fld>
             <a:endParaRPr lang="en-GB"/>
           </a:p>
@@ -1164,7 +1164,7 @@
           <a:p>
             <a:fld id="{4A4742DE-6149-4F75-B5AD-2A8ADB954AD9}" type="datetimeFigureOut">
               <a:rPr lang="en-GB" smtClean="0"/>
-              <a:t>03/06/2017</a:t>
+              <a:t>04/06/2017</a:t>
             </a:fld>
             <a:endParaRPr lang="en-GB"/>
           </a:p>
@@ -1408,7 +1408,7 @@
           <a:p>
             <a:fld id="{4A4742DE-6149-4F75-B5AD-2A8ADB954AD9}" type="datetimeFigureOut">
               <a:rPr lang="en-GB" smtClean="0"/>
-              <a:t>03/06/2017</a:t>
+              <a:t>04/06/2017</a:t>
             </a:fld>
             <a:endParaRPr lang="en-GB"/>
           </a:p>
@@ -1640,7 +1640,7 @@
           <a:p>
             <a:fld id="{4A4742DE-6149-4F75-B5AD-2A8ADB954AD9}" type="datetimeFigureOut">
               <a:rPr lang="en-GB" smtClean="0"/>
-              <a:t>03/06/2017</a:t>
+              <a:t>04/06/2017</a:t>
             </a:fld>
             <a:endParaRPr lang="en-GB"/>
           </a:p>
@@ -2007,7 +2007,7 @@
           <a:p>
             <a:fld id="{4A4742DE-6149-4F75-B5AD-2A8ADB954AD9}" type="datetimeFigureOut">
               <a:rPr lang="en-GB" smtClean="0"/>
-              <a:t>03/06/2017</a:t>
+              <a:t>04/06/2017</a:t>
             </a:fld>
             <a:endParaRPr lang="en-GB"/>
           </a:p>
@@ -2125,7 +2125,7 @@
           <a:p>
             <a:fld id="{4A4742DE-6149-4F75-B5AD-2A8ADB954AD9}" type="datetimeFigureOut">
               <a:rPr lang="en-GB" smtClean="0"/>
-              <a:t>03/06/2017</a:t>
+              <a:t>04/06/2017</a:t>
             </a:fld>
             <a:endParaRPr lang="en-GB"/>
           </a:p>
@@ -2220,7 +2220,7 @@
           <a:p>
             <a:fld id="{4A4742DE-6149-4F75-B5AD-2A8ADB954AD9}" type="datetimeFigureOut">
               <a:rPr lang="en-GB" smtClean="0"/>
-              <a:t>03/06/2017</a:t>
+              <a:t>04/06/2017</a:t>
             </a:fld>
             <a:endParaRPr lang="en-GB"/>
           </a:p>
@@ -2497,7 +2497,7 @@
           <a:p>
             <a:fld id="{4A4742DE-6149-4F75-B5AD-2A8ADB954AD9}" type="datetimeFigureOut">
               <a:rPr lang="en-GB" smtClean="0"/>
-              <a:t>03/06/2017</a:t>
+              <a:t>04/06/2017</a:t>
             </a:fld>
             <a:endParaRPr lang="en-GB"/>
           </a:p>
@@ -2754,7 +2754,7 @@
           <a:p>
             <a:fld id="{4A4742DE-6149-4F75-B5AD-2A8ADB954AD9}" type="datetimeFigureOut">
               <a:rPr lang="en-GB" smtClean="0"/>
-              <a:t>03/06/2017</a:t>
+              <a:t>04/06/2017</a:t>
             </a:fld>
             <a:endParaRPr lang="en-GB"/>
           </a:p>
@@ -2977,7 +2977,7 @@
           <a:p>
             <a:fld id="{4A4742DE-6149-4F75-B5AD-2A8ADB954AD9}" type="datetimeFigureOut">
               <a:rPr lang="en-GB" smtClean="0"/>
-              <a:t>03/06/2017</a:t>
+              <a:t>04/06/2017</a:t>
             </a:fld>
             <a:endParaRPr lang="en-GB"/>
           </a:p>
@@ -6265,7 +6265,7 @@
         </p:spPr>
         <p:txBody>
           <a:bodyPr>
-            <a:normAutofit fontScale="85000" lnSpcReduction="20000"/>
+            <a:normAutofit fontScale="70000" lnSpcReduction="20000"/>
           </a:bodyPr>
           <a:lstStyle/>
           <a:p>
@@ -6320,7 +6320,7 @@
             </a:endParaRPr>
           </a:p>
           <a:p>
-            <a:pPr algn="just">
+            <a:pPr>
               <a:lnSpc>
                 <a:spcPct val="114000"/>
               </a:lnSpc>
@@ -6334,22 +6334,24 @@
             <a:r>
               <a:rPr lang="es-ES" sz="2800" dirty="0">
                 <a:latin typeface="Arial Rounded MT Bold" panose="020F0704030504030204" pitchFamily="34" charset="0"/>
+                <a:hlinkClick r:id="rId3"/>
               </a:rPr>
-              <a:t>LINK AQUÍ</a:t>
+              <a:t>https://github.com/makers-upv/taller-pcb/blob/master/Eagle PCB &amp; </a:t>
             </a:r>
-          </a:p>
-          <a:p>
-            <a:pPr algn="just">
-              <a:lnSpc>
-                <a:spcPct val="114000"/>
-              </a:lnSpc>
-              <a:spcBef>
-                <a:spcPts val="0"/>
-              </a:spcBef>
-              <a:spcAft>
-                <a:spcPts val="1000"/>
-              </a:spcAft>
-            </a:pPr>
+            <a:r>
+              <a:rPr lang="es-ES" sz="2800" dirty="0" err="1">
+                <a:latin typeface="Arial Rounded MT Bold" panose="020F0704030504030204" pitchFamily="34" charset="0"/>
+                <a:hlinkClick r:id="rId3"/>
+              </a:rPr>
+              <a:t>Design</a:t>
+            </a:r>
+            <a:r>
+              <a:rPr lang="es-ES" sz="2800" dirty="0">
+                <a:latin typeface="Arial Rounded MT Bold" panose="020F0704030504030204" pitchFamily="34" charset="0"/>
+                <a:hlinkClick r:id="rId3"/>
+              </a:rPr>
+              <a:t> - Santiago Junquera.pdf</a:t>
+            </a:r>
             <a:endParaRPr lang="es-ES" sz="2000" dirty="0">
               <a:latin typeface="Arial Rounded MT Bold" panose="020F0704030504030204" pitchFamily="34" charset="0"/>
             </a:endParaRPr>

</xml_diff>